<commit_message>
Sept. 2018 test-fix updates.
</commit_message>
<xml_diff>
--- a/Whiteboard design session/WDS trainer presentation - Big Compute.pptx
+++ b/Whiteboard design session/WDS trainer presentation - Big Compute.pptx
@@ -240,7 +240,7 @@
           <a:p>
             <a:fld id="{52A13B17-C506-4D51-BB37-16B365906619}" type="datetimeFigureOut">
               <a:rPr lang="en-US" smtClean="0"/>
-              <a:t>7/31/2018</a:t>
+              <a:t>9/30/2018</a:t>
             </a:fld>
             <a:endParaRPr lang="en-US" dirty="0"/>
           </a:p>
@@ -17592,7 +17592,12 @@
             <p:ph type="title"/>
           </p:nvPr>
         </p:nvSpPr>
-        <p:spPr/>
+        <p:spPr>
+          <a:xfrm>
+            <a:off x="269240" y="276811"/>
+            <a:ext cx="11655840" cy="899665"/>
+          </a:xfrm>
+        </p:spPr>
         <p:txBody>
           <a:bodyPr>
             <a:normAutofit fontScale="90000"/>
@@ -18327,7 +18332,7 @@
             </a:pPr>
             <a:r>
               <a:rPr lang="en-US" sz="2000" dirty="0"/>
-              <a:t>Leverage Batch Labs and the Azure Portal for management and monitoring</a:t>
+              <a:t>Leverage Batch Explorer and the Azure Portal for management and monitoring</a:t>
             </a:r>
           </a:p>
           <a:p>

</xml_diff>